<commit_message>
Machine learning details added
</commit_message>
<xml_diff>
--- a/Presentations/Microsoft Azure.pptx
+++ b/Presentations/Microsoft Azure.pptx
@@ -5,10 +5,10 @@
     <p:sldMasterId id="2147483722" r:id="rId1"/>
   </p:sldMasterIdLst>
   <p:notesMasterIdLst>
-    <p:notesMasterId r:id="rId58"/>
+    <p:notesMasterId r:id="rId64"/>
   </p:notesMasterIdLst>
   <p:handoutMasterIdLst>
-    <p:handoutMasterId r:id="rId59"/>
+    <p:handoutMasterId r:id="rId65"/>
   </p:handoutMasterIdLst>
   <p:sldIdLst>
     <p:sldId id="256" r:id="rId2"/>
@@ -67,6 +67,12 @@
     <p:sldId id="297" r:id="rId55"/>
     <p:sldId id="299" r:id="rId56"/>
     <p:sldId id="300" r:id="rId57"/>
+    <p:sldId id="313" r:id="rId58"/>
+    <p:sldId id="314" r:id="rId59"/>
+    <p:sldId id="315" r:id="rId60"/>
+    <p:sldId id="316" r:id="rId61"/>
+    <p:sldId id="317" r:id="rId62"/>
+    <p:sldId id="318" r:id="rId63"/>
   </p:sldIdLst>
   <p:sldSz cx="12192000" cy="6858000"/>
   <p:notesSz cx="6858000" cy="9144000"/>
@@ -256,6 +262,16 @@
             <p14:sldId id="300"/>
           </p14:sldIdLst>
         </p14:section>
+        <p14:section name="Azure - Machine Learning" id="{DCB1F77A-9825-4123-9354-D784944406D1}">
+          <p14:sldIdLst>
+            <p14:sldId id="313"/>
+            <p14:sldId id="314"/>
+            <p14:sldId id="315"/>
+            <p14:sldId id="316"/>
+            <p14:sldId id="317"/>
+            <p14:sldId id="318"/>
+          </p14:sldIdLst>
+        </p14:section>
       </p14:sectionLst>
     </p:ext>
     <p:ext uri="{EFAFB233-063F-42B5-8137-9DF3F51BA10A}">
@@ -362,7 +378,7 @@
           <a:p>
             <a:fld id="{0256CCF8-6C31-4DE2-865E-3D1B4B01169A}" type="datetimeFigureOut">
               <a:rPr lang="en-US" smtClean="0"/>
-              <a:t>6/18/2015</a:t>
+              <a:t>7/3/2015</a:t>
             </a:fld>
             <a:endParaRPr lang="en-US"/>
           </a:p>
@@ -527,7 +543,7 @@
           <a:p>
             <a:fld id="{EB8C5C66-7D4C-418C-B5A9-78F4711288FF}" type="datetimeFigureOut">
               <a:rPr lang="en-US" smtClean="0"/>
-              <a:t>6/18/2015</a:t>
+              <a:t>7/3/2015</a:t>
             </a:fld>
             <a:endParaRPr lang="en-US"/>
           </a:p>
@@ -2172,7 +2188,7 @@
           <a:p>
             <a:fld id="{402B9795-92DC-40DC-A1CA-9A4B349D7824}" type="datetimeFigureOut">
               <a:rPr lang="en-US" smtClean="0"/>
-              <a:t>6/18/2015</a:t>
+              <a:t>7/3/2015</a:t>
             </a:fld>
             <a:endParaRPr lang="en-US"/>
           </a:p>
@@ -2362,7 +2378,7 @@
             <a:fld id="{C6C52C72-DE31-F449-A4ED-4C594FD91407}" type="datetimeFigureOut">
               <a:rPr lang="en-US" smtClean="0"/>
               <a:pPr/>
-              <a:t>6/18/2015</a:t>
+              <a:t>7/3/2015</a:t>
             </a:fld>
             <a:endParaRPr lang="en-US" dirty="0"/>
           </a:p>
@@ -2563,7 +2579,7 @@
             <a:fld id="{ED62726E-379B-B349-9EED-81ED093FA806}" type="datetimeFigureOut">
               <a:rPr lang="en-US" smtClean="0"/>
               <a:pPr/>
-              <a:t>6/18/2015</a:t>
+              <a:t>7/3/2015</a:t>
             </a:fld>
             <a:endParaRPr lang="en-US" dirty="0"/>
           </a:p>
@@ -2754,7 +2770,7 @@
             <a:fld id="{9B3A1323-8D79-1946-B0D7-40001CF92E9D}" type="datetimeFigureOut">
               <a:rPr lang="en-US" smtClean="0"/>
               <a:pPr/>
-              <a:t>6/18/2015</a:t>
+              <a:t>7/3/2015</a:t>
             </a:fld>
             <a:endParaRPr lang="en-US" dirty="0"/>
           </a:p>
@@ -3021,7 +3037,7 @@
             <a:fld id="{8DFA1846-DA80-1C48-A609-854EA85C59AD}" type="datetimeFigureOut">
               <a:rPr lang="en-US" smtClean="0"/>
               <a:pPr/>
-              <a:t>6/18/2015</a:t>
+              <a:t>7/3/2015</a:t>
             </a:fld>
             <a:endParaRPr lang="en-US" dirty="0"/>
           </a:p>
@@ -3274,7 +3290,7 @@
             <a:fld id="{57302355-E14B-8545-A8F8-0FE83CC9D524}" type="datetimeFigureOut">
               <a:rPr lang="en-US" smtClean="0"/>
               <a:pPr/>
-              <a:t>6/18/2015</a:t>
+              <a:t>7/3/2015</a:t>
             </a:fld>
             <a:endParaRPr lang="en-US" dirty="0"/>
           </a:p>
@@ -3662,7 +3678,7 @@
             <a:fld id="{02640F58-564D-2B4F-AE67-E407BA4FCF45}" type="datetimeFigureOut">
               <a:rPr lang="en-US" smtClean="0"/>
               <a:pPr/>
-              <a:t>6/18/2015</a:t>
+              <a:t>7/3/2015</a:t>
             </a:fld>
             <a:endParaRPr lang="en-US" dirty="0"/>
           </a:p>
@@ -3801,7 +3817,7 @@
             <a:fld id="{F13A34C8-038E-2045-AF43-DF7DBB8E0E9E}" type="datetimeFigureOut">
               <a:rPr lang="en-US" smtClean="0"/>
               <a:pPr/>
-              <a:t>6/18/2015</a:t>
+              <a:t>7/3/2015</a:t>
             </a:fld>
             <a:endParaRPr lang="en-US" dirty="0"/>
           </a:p>
@@ -3917,7 +3933,7 @@
             <a:fld id="{8818C68F-D26B-8F47-958C-23B49CF8A634}" type="datetimeFigureOut">
               <a:rPr lang="en-US" smtClean="0"/>
               <a:pPr/>
-              <a:t>6/18/2015</a:t>
+              <a:t>7/3/2015</a:t>
             </a:fld>
             <a:endParaRPr lang="en-US" dirty="0"/>
           </a:p>
@@ -4215,7 +4231,7 @@
             <a:fld id="{D0DF5E60-9974-AC48-9591-99C2BB44B7CF}" type="datetimeFigureOut">
               <a:rPr lang="en-US" smtClean="0"/>
               <a:pPr/>
-              <a:t>6/18/2015</a:t>
+              <a:t>7/3/2015</a:t>
             </a:fld>
             <a:endParaRPr lang="en-US" dirty="0"/>
           </a:p>
@@ -4493,7 +4509,7 @@
             <a:fld id="{18C79C5D-2A6F-F04D-97DA-BEF2467B64E4}" type="datetimeFigureOut">
               <a:rPr lang="en-US" smtClean="0"/>
               <a:pPr/>
-              <a:t>6/18/2015</a:t>
+              <a:t>7/3/2015</a:t>
             </a:fld>
             <a:endParaRPr lang="en-US" dirty="0"/>
           </a:p>
@@ -4727,7 +4743,7 @@
             <a:fld id="{09B482E8-6E0E-1B4F-B1FD-C69DB9E858D9}" type="datetimeFigureOut">
               <a:rPr lang="en-US" smtClean="0"/>
               <a:pPr/>
-              <a:t>6/18/2015</a:t>
+              <a:t>7/3/2015</a:t>
             </a:fld>
             <a:endParaRPr lang="en-US" dirty="0"/>
           </a:p>
@@ -11800,6 +11816,466 @@
 </p:sld>
 </file>
 
+<file path=ppt/slides/slide57.xml><?xml version="1.0" encoding="utf-8"?>
+<p:sld xmlns:a="http://schemas.openxmlformats.org/drawingml/2006/main" xmlns:r="http://schemas.openxmlformats.org/officeDocument/2006/relationships" xmlns:p="http://schemas.openxmlformats.org/presentationml/2006/main">
+  <p:cSld>
+    <p:spTree>
+      <p:nvGrpSpPr>
+        <p:cNvPr id="1" name=""/>
+        <p:cNvGrpSpPr/>
+        <p:nvPr/>
+      </p:nvGrpSpPr>
+      <p:grpSpPr>
+        <a:xfrm>
+          <a:off x="0" y="0"/>
+          <a:ext cx="0" cy="0"/>
+          <a:chOff x="0" y="0"/>
+          <a:chExt cx="0" cy="0"/>
+        </a:xfrm>
+      </p:grpSpPr>
+      <p:sp>
+        <p:nvSpPr>
+          <p:cNvPr id="2" name="Title 1"/>
+          <p:cNvSpPr>
+            <a:spLocks noGrp="1"/>
+          </p:cNvSpPr>
+          <p:nvPr>
+            <p:ph type="ctrTitle"/>
+          </p:nvPr>
+        </p:nvSpPr>
+        <p:spPr/>
+        <p:txBody>
+          <a:bodyPr/>
+          <a:lstStyle/>
+          <a:p>
+            <a:r>
+              <a:rPr lang="en-US" dirty="0"/>
+              <a:t>Azure </a:t>
+            </a:r>
+            <a:r>
+              <a:rPr lang="en-US" dirty="0" smtClean="0"/>
+              <a:t>– Machine Learning</a:t>
+            </a:r>
+            <a:endParaRPr lang="en-US" dirty="0"/>
+          </a:p>
+        </p:txBody>
+      </p:sp>
+      <p:sp>
+        <p:nvSpPr>
+          <p:cNvPr id="3" name="Subtitle 2"/>
+          <p:cNvSpPr>
+            <a:spLocks noGrp="1"/>
+          </p:cNvSpPr>
+          <p:nvPr>
+            <p:ph type="subTitle" idx="1"/>
+          </p:nvPr>
+        </p:nvSpPr>
+        <p:spPr/>
+        <p:txBody>
+          <a:bodyPr/>
+          <a:lstStyle/>
+          <a:p>
+            <a:endParaRPr lang="en-US"/>
+          </a:p>
+        </p:txBody>
+      </p:sp>
+    </p:spTree>
+    <p:extLst>
+      <p:ext uri="{BB962C8B-B14F-4D97-AF65-F5344CB8AC3E}">
+        <p14:creationId xmlns:p14="http://schemas.microsoft.com/office/powerpoint/2010/main" val="1679586381"/>
+      </p:ext>
+    </p:extLst>
+  </p:cSld>
+  <p:clrMapOvr>
+    <a:masterClrMapping/>
+  </p:clrMapOvr>
+  <mc:AlternateContent xmlns:mc="http://schemas.openxmlformats.org/markup-compatibility/2006" xmlns:p14="http://schemas.microsoft.com/office/powerpoint/2010/main">
+    <mc:Choice Requires="p14">
+      <p:transition spd="med">
+        <p14:prism/>
+      </p:transition>
+    </mc:Choice>
+    <mc:Fallback xmlns="">
+      <p:transition spd="med">
+        <p:fade/>
+      </p:transition>
+    </mc:Fallback>
+  </mc:AlternateContent>
+  <p:timing>
+    <p:tnLst>
+      <p:par>
+        <p:cTn id="1" dur="indefinite" restart="never" nodeType="tmRoot"/>
+      </p:par>
+    </p:tnLst>
+  </p:timing>
+</p:sld>
+</file>
+
+<file path=ppt/slides/slide58.xml><?xml version="1.0" encoding="utf-8"?>
+<p:sld xmlns:a="http://schemas.openxmlformats.org/drawingml/2006/main" xmlns:r="http://schemas.openxmlformats.org/officeDocument/2006/relationships" xmlns:p="http://schemas.openxmlformats.org/presentationml/2006/main">
+  <p:cSld>
+    <p:spTree>
+      <p:nvGrpSpPr>
+        <p:cNvPr id="1" name=""/>
+        <p:cNvGrpSpPr/>
+        <p:nvPr/>
+      </p:nvGrpSpPr>
+      <p:grpSpPr>
+        <a:xfrm>
+          <a:off x="0" y="0"/>
+          <a:ext cx="0" cy="0"/>
+          <a:chOff x="0" y="0"/>
+          <a:chExt cx="0" cy="0"/>
+        </a:xfrm>
+      </p:grpSpPr>
+      <p:sp>
+        <p:nvSpPr>
+          <p:cNvPr id="2" name="Title 1"/>
+          <p:cNvSpPr>
+            <a:spLocks noGrp="1"/>
+          </p:cNvSpPr>
+          <p:nvPr>
+            <p:ph type="title"/>
+          </p:nvPr>
+        </p:nvSpPr>
+        <p:spPr/>
+        <p:txBody>
+          <a:bodyPr/>
+          <a:lstStyle/>
+          <a:p>
+            <a:r>
+              <a:rPr lang="en-US" dirty="0" smtClean="0"/>
+              <a:t>Target Audience</a:t>
+            </a:r>
+            <a:endParaRPr lang="en-US" dirty="0"/>
+          </a:p>
+        </p:txBody>
+      </p:sp>
+      <p:sp>
+        <p:nvSpPr>
+          <p:cNvPr id="3" name="Content Placeholder 2"/>
+          <p:cNvSpPr>
+            <a:spLocks noGrp="1"/>
+          </p:cNvSpPr>
+          <p:nvPr>
+            <p:ph idx="1"/>
+          </p:nvPr>
+        </p:nvSpPr>
+        <p:spPr/>
+        <p:txBody>
+          <a:bodyPr/>
+          <a:lstStyle/>
+          <a:p>
+            <a:r>
+              <a:rPr lang="en-US" dirty="0" smtClean="0"/>
+              <a:t>Developer</a:t>
+            </a:r>
+          </a:p>
+          <a:p>
+            <a:r>
+              <a:rPr lang="en-US" dirty="0" smtClean="0"/>
+              <a:t>BI Professional</a:t>
+            </a:r>
+          </a:p>
+          <a:p>
+            <a:r>
+              <a:rPr lang="en-US" dirty="0" smtClean="0"/>
+              <a:t>Data Scientist</a:t>
+            </a:r>
+          </a:p>
+          <a:p>
+            <a:r>
+              <a:rPr lang="en-US" dirty="0" smtClean="0"/>
+              <a:t>Enthusiast</a:t>
+            </a:r>
+          </a:p>
+          <a:p>
+            <a:endParaRPr lang="en-US" dirty="0"/>
+          </a:p>
+        </p:txBody>
+      </p:sp>
+    </p:spTree>
+    <p:extLst>
+      <p:ext uri="{BB962C8B-B14F-4D97-AF65-F5344CB8AC3E}">
+        <p14:creationId xmlns:p14="http://schemas.microsoft.com/office/powerpoint/2010/main" val="2483622373"/>
+      </p:ext>
+    </p:extLst>
+  </p:cSld>
+  <p:clrMapOvr>
+    <a:masterClrMapping/>
+  </p:clrMapOvr>
+  <mc:AlternateContent xmlns:mc="http://schemas.openxmlformats.org/markup-compatibility/2006" xmlns:p14="http://schemas.microsoft.com/office/powerpoint/2010/main">
+    <mc:Choice Requires="p14">
+      <p:transition spd="med">
+        <p14:prism/>
+      </p:transition>
+    </mc:Choice>
+    <mc:Fallback xmlns="">
+      <p:transition spd="med">
+        <p:fade/>
+      </p:transition>
+    </mc:Fallback>
+  </mc:AlternateContent>
+  <p:timing>
+    <p:tnLst>
+      <p:par>
+        <p:cTn id="1" dur="indefinite" restart="never" nodeType="tmRoot">
+          <p:childTnLst>
+            <p:seq concurrent="1" nextAc="seek">
+              <p:cTn id="2" dur="indefinite" nodeType="mainSeq">
+                <p:childTnLst>
+                  <p:par>
+                    <p:cTn id="3" fill="hold">
+                      <p:stCondLst>
+                        <p:cond delay="indefinite"/>
+                      </p:stCondLst>
+                      <p:childTnLst>
+                        <p:par>
+                          <p:cTn id="4" fill="hold">
+                            <p:stCondLst>
+                              <p:cond delay="0"/>
+                            </p:stCondLst>
+                            <p:childTnLst>
+                              <p:par>
+                                <p:cTn id="5" presetID="42" presetClass="path" presetSubtype="0" accel="50000" decel="50000" fill="hold" nodeType="clickEffect">
+                                  <p:stCondLst>
+                                    <p:cond delay="0"/>
+                                  </p:stCondLst>
+                                  <p:childTnLst>
+                                    <p:animMotion origin="layout" path="M 0 0 L 0 0.25 E" pathEditMode="relative" ptsTypes="">
+                                      <p:cBhvr>
+                                        <p:cTn id="6" dur="2000" spd="-100000" fill="hold"/>
+                                        <p:tgtEl>
+                                          <p:spTgt spid="3">
+                                            <p:txEl>
+                                              <p:pRg st="0" end="0"/>
+                                            </p:txEl>
+                                          </p:spTgt>
+                                        </p:tgtEl>
+                                        <p:attrNameLst>
+                                          <p:attrName>ppt_x</p:attrName>
+                                          <p:attrName>ppt_y</p:attrName>
+                                        </p:attrNameLst>
+                                      </p:cBhvr>
+                                    </p:animMotion>
+                                  </p:childTnLst>
+                                </p:cTn>
+                              </p:par>
+                              <p:par>
+                                <p:cTn id="7" presetID="42" presetClass="path" presetSubtype="0" accel="50000" decel="50000" fill="hold" nodeType="withEffect">
+                                  <p:stCondLst>
+                                    <p:cond delay="0"/>
+                                  </p:stCondLst>
+                                  <p:childTnLst>
+                                    <p:animMotion origin="layout" path="M 0 0 L 0 0.25 E" pathEditMode="relative" ptsTypes="">
+                                      <p:cBhvr>
+                                        <p:cTn id="8" dur="2000" spd="-100000" fill="hold"/>
+                                        <p:tgtEl>
+                                          <p:spTgt spid="3">
+                                            <p:txEl>
+                                              <p:pRg st="1" end="1"/>
+                                            </p:txEl>
+                                          </p:spTgt>
+                                        </p:tgtEl>
+                                        <p:attrNameLst>
+                                          <p:attrName>ppt_x</p:attrName>
+                                          <p:attrName>ppt_y</p:attrName>
+                                        </p:attrNameLst>
+                                      </p:cBhvr>
+                                    </p:animMotion>
+                                  </p:childTnLst>
+                                </p:cTn>
+                              </p:par>
+                              <p:par>
+                                <p:cTn id="9" presetID="42" presetClass="path" presetSubtype="0" accel="50000" decel="50000" fill="hold" nodeType="withEffect">
+                                  <p:stCondLst>
+                                    <p:cond delay="0"/>
+                                  </p:stCondLst>
+                                  <p:childTnLst>
+                                    <p:animMotion origin="layout" path="M 0 0 L 0 0.25 E" pathEditMode="relative" ptsTypes="">
+                                      <p:cBhvr>
+                                        <p:cTn id="10" dur="2000" spd="-100000" fill="hold"/>
+                                        <p:tgtEl>
+                                          <p:spTgt spid="3">
+                                            <p:txEl>
+                                              <p:pRg st="2" end="2"/>
+                                            </p:txEl>
+                                          </p:spTgt>
+                                        </p:tgtEl>
+                                        <p:attrNameLst>
+                                          <p:attrName>ppt_x</p:attrName>
+                                          <p:attrName>ppt_y</p:attrName>
+                                        </p:attrNameLst>
+                                      </p:cBhvr>
+                                    </p:animMotion>
+                                  </p:childTnLst>
+                                </p:cTn>
+                              </p:par>
+                              <p:par>
+                                <p:cTn id="11" presetID="42" presetClass="path" presetSubtype="0" accel="50000" decel="50000" fill="hold" nodeType="withEffect">
+                                  <p:stCondLst>
+                                    <p:cond delay="0"/>
+                                  </p:stCondLst>
+                                  <p:childTnLst>
+                                    <p:animMotion origin="layout" path="M 0 0 L 0 0.25 E" pathEditMode="relative" ptsTypes="">
+                                      <p:cBhvr>
+                                        <p:cTn id="12" dur="2000" spd="-100000" fill="hold"/>
+                                        <p:tgtEl>
+                                          <p:spTgt spid="3">
+                                            <p:txEl>
+                                              <p:pRg st="3" end="3"/>
+                                            </p:txEl>
+                                          </p:spTgt>
+                                        </p:tgtEl>
+                                        <p:attrNameLst>
+                                          <p:attrName>ppt_x</p:attrName>
+                                          <p:attrName>ppt_y</p:attrName>
+                                        </p:attrNameLst>
+                                      </p:cBhvr>
+                                    </p:animMotion>
+                                  </p:childTnLst>
+                                </p:cTn>
+                              </p:par>
+                            </p:childTnLst>
+                          </p:cTn>
+                        </p:par>
+                      </p:childTnLst>
+                    </p:cTn>
+                  </p:par>
+                </p:childTnLst>
+              </p:cTn>
+              <p:prevCondLst>
+                <p:cond evt="onPrev" delay="0">
+                  <p:tgtEl>
+                    <p:sldTgt/>
+                  </p:tgtEl>
+                </p:cond>
+              </p:prevCondLst>
+              <p:nextCondLst>
+                <p:cond evt="onNext" delay="0">
+                  <p:tgtEl>
+                    <p:sldTgt/>
+                  </p:tgtEl>
+                </p:cond>
+              </p:nextCondLst>
+            </p:seq>
+          </p:childTnLst>
+        </p:cTn>
+      </p:par>
+    </p:tnLst>
+  </p:timing>
+</p:sld>
+</file>
+
+<file path=ppt/slides/slide59.xml><?xml version="1.0" encoding="utf-8"?>
+<p:sld xmlns:a="http://schemas.openxmlformats.org/drawingml/2006/main" xmlns:r="http://schemas.openxmlformats.org/officeDocument/2006/relationships" xmlns:p="http://schemas.openxmlformats.org/presentationml/2006/main">
+  <p:cSld>
+    <p:spTree>
+      <p:nvGrpSpPr>
+        <p:cNvPr id="1" name=""/>
+        <p:cNvGrpSpPr/>
+        <p:nvPr/>
+      </p:nvGrpSpPr>
+      <p:grpSpPr>
+        <a:xfrm>
+          <a:off x="0" y="0"/>
+          <a:ext cx="0" cy="0"/>
+          <a:chOff x="0" y="0"/>
+          <a:chExt cx="0" cy="0"/>
+        </a:xfrm>
+      </p:grpSpPr>
+      <p:sp>
+        <p:nvSpPr>
+          <p:cNvPr id="2" name="Title 1"/>
+          <p:cNvSpPr>
+            <a:spLocks noGrp="1"/>
+          </p:cNvSpPr>
+          <p:nvPr>
+            <p:ph type="title"/>
+          </p:nvPr>
+        </p:nvSpPr>
+        <p:spPr/>
+        <p:txBody>
+          <a:bodyPr/>
+          <a:lstStyle/>
+          <a:p>
+            <a:r>
+              <a:rPr lang="en-US" dirty="0" smtClean="0"/>
+              <a:t>Background</a:t>
+            </a:r>
+            <a:endParaRPr lang="en-US" dirty="0"/>
+          </a:p>
+        </p:txBody>
+      </p:sp>
+      <p:sp>
+        <p:nvSpPr>
+          <p:cNvPr id="3" name="Content Placeholder 2"/>
+          <p:cNvSpPr>
+            <a:spLocks noGrp="1"/>
+          </p:cNvSpPr>
+          <p:nvPr>
+            <p:ph idx="1"/>
+          </p:nvPr>
+        </p:nvSpPr>
+        <p:spPr/>
+        <p:txBody>
+          <a:bodyPr/>
+          <a:lstStyle/>
+          <a:p>
+            <a:r>
+              <a:rPr lang="en-US" dirty="0" smtClean="0"/>
+              <a:t>What is it?</a:t>
+            </a:r>
+          </a:p>
+          <a:p>
+            <a:r>
+              <a:rPr lang="en-US" dirty="0" smtClean="0"/>
+              <a:t>Why do we need it?</a:t>
+            </a:r>
+          </a:p>
+          <a:p>
+            <a:r>
+              <a:rPr lang="en-US" dirty="0" smtClean="0"/>
+              <a:t>Predictive Analysis</a:t>
+            </a:r>
+          </a:p>
+          <a:p>
+            <a:endParaRPr lang="en-US" dirty="0"/>
+          </a:p>
+        </p:txBody>
+      </p:sp>
+    </p:spTree>
+    <p:extLst>
+      <p:ext uri="{BB962C8B-B14F-4D97-AF65-F5344CB8AC3E}">
+        <p14:creationId xmlns:p14="http://schemas.microsoft.com/office/powerpoint/2010/main" val="1374652014"/>
+      </p:ext>
+    </p:extLst>
+  </p:cSld>
+  <p:clrMapOvr>
+    <a:masterClrMapping/>
+  </p:clrMapOvr>
+  <mc:AlternateContent xmlns:mc="http://schemas.openxmlformats.org/markup-compatibility/2006" xmlns:p14="http://schemas.microsoft.com/office/powerpoint/2010/main">
+    <mc:Choice Requires="p14">
+      <p:transition spd="med">
+        <p14:prism/>
+      </p:transition>
+    </mc:Choice>
+    <mc:Fallback xmlns="">
+      <p:transition spd="med">
+        <p:fade/>
+      </p:transition>
+    </mc:Fallback>
+  </mc:AlternateContent>
+  <p:timing>
+    <p:tnLst>
+      <p:par>
+        <p:cTn id="1" dur="indefinite" restart="never" nodeType="tmRoot"/>
+      </p:par>
+    </p:tnLst>
+  </p:timing>
+</p:sld>
+</file>
+
 <file path=ppt/slides/slide6.xml><?xml version="1.0" encoding="utf-8"?>
 <p:sld xmlns:a="http://schemas.openxmlformats.org/drawingml/2006/main" xmlns:r="http://schemas.openxmlformats.org/officeDocument/2006/relationships" xmlns:p="http://schemas.openxmlformats.org/presentationml/2006/main">
   <p:cSld>
@@ -11918,6 +12394,340 @@
     <p:extLst>
       <p:ext uri="{BB962C8B-B14F-4D97-AF65-F5344CB8AC3E}">
         <p14:creationId xmlns:p14="http://schemas.microsoft.com/office/powerpoint/2010/main" val="2066799954"/>
+      </p:ext>
+    </p:extLst>
+  </p:cSld>
+  <p:clrMapOvr>
+    <a:masterClrMapping/>
+  </p:clrMapOvr>
+  <mc:AlternateContent xmlns:mc="http://schemas.openxmlformats.org/markup-compatibility/2006" xmlns:p14="http://schemas.microsoft.com/office/powerpoint/2010/main">
+    <mc:Choice Requires="p14">
+      <p:transition spd="med">
+        <p14:prism/>
+      </p:transition>
+    </mc:Choice>
+    <mc:Fallback xmlns="">
+      <p:transition spd="med">
+        <p:fade/>
+      </p:transition>
+    </mc:Fallback>
+  </mc:AlternateContent>
+  <p:timing>
+    <p:tnLst>
+      <p:par>
+        <p:cTn id="1" dur="indefinite" restart="never" nodeType="tmRoot"/>
+      </p:par>
+    </p:tnLst>
+  </p:timing>
+</p:sld>
+</file>
+
+<file path=ppt/slides/slide60.xml><?xml version="1.0" encoding="utf-8"?>
+<p:sld xmlns:a="http://schemas.openxmlformats.org/drawingml/2006/main" xmlns:r="http://schemas.openxmlformats.org/officeDocument/2006/relationships" xmlns:p="http://schemas.openxmlformats.org/presentationml/2006/main">
+  <p:cSld>
+    <p:spTree>
+      <p:nvGrpSpPr>
+        <p:cNvPr id="1" name=""/>
+        <p:cNvGrpSpPr/>
+        <p:nvPr/>
+      </p:nvGrpSpPr>
+      <p:grpSpPr>
+        <a:xfrm>
+          <a:off x="0" y="0"/>
+          <a:ext cx="0" cy="0"/>
+          <a:chOff x="0" y="0"/>
+          <a:chExt cx="0" cy="0"/>
+        </a:xfrm>
+      </p:grpSpPr>
+      <p:sp>
+        <p:nvSpPr>
+          <p:cNvPr id="2" name="Title 1"/>
+          <p:cNvSpPr>
+            <a:spLocks noGrp="1"/>
+          </p:cNvSpPr>
+          <p:nvPr>
+            <p:ph type="title"/>
+          </p:nvPr>
+        </p:nvSpPr>
+        <p:spPr/>
+        <p:txBody>
+          <a:bodyPr/>
+          <a:lstStyle/>
+          <a:p>
+            <a:r>
+              <a:rPr lang="en-US" dirty="0" smtClean="0"/>
+              <a:t>Machine Learning</a:t>
+            </a:r>
+            <a:endParaRPr lang="en-US" dirty="0"/>
+          </a:p>
+        </p:txBody>
+      </p:sp>
+      <p:sp>
+        <p:nvSpPr>
+          <p:cNvPr id="3" name="Content Placeholder 2"/>
+          <p:cNvSpPr>
+            <a:spLocks noGrp="1"/>
+          </p:cNvSpPr>
+          <p:nvPr>
+            <p:ph idx="1"/>
+          </p:nvPr>
+        </p:nvSpPr>
+        <p:spPr/>
+        <p:txBody>
+          <a:bodyPr/>
+          <a:lstStyle/>
+          <a:p>
+            <a:pPr marL="0" indent="0">
+              <a:buNone/>
+            </a:pPr>
+            <a:r>
+              <a:rPr lang="en-US" dirty="0" smtClean="0"/>
+              <a:t>The goal of a machine learning is to </a:t>
+            </a:r>
+            <a:r>
+              <a:rPr lang="en-US" dirty="0"/>
+              <a:t>program </a:t>
+            </a:r>
+            <a:r>
+              <a:rPr lang="en-US" dirty="0" smtClean="0"/>
+              <a:t>computers to use </a:t>
+            </a:r>
+            <a:r>
+              <a:rPr lang="en-US" b="1" dirty="0" smtClean="0"/>
+              <a:t>example data or past experience</a:t>
+            </a:r>
+            <a:r>
+              <a:rPr lang="en-US" dirty="0" smtClean="0"/>
+              <a:t> to solve given problem</a:t>
+            </a:r>
+            <a:endParaRPr lang="en-US" dirty="0"/>
+          </a:p>
+        </p:txBody>
+      </p:sp>
+    </p:spTree>
+    <p:extLst>
+      <p:ext uri="{BB962C8B-B14F-4D97-AF65-F5344CB8AC3E}">
+        <p14:creationId xmlns:p14="http://schemas.microsoft.com/office/powerpoint/2010/main" val="4136690595"/>
+      </p:ext>
+    </p:extLst>
+  </p:cSld>
+  <p:clrMapOvr>
+    <a:masterClrMapping/>
+  </p:clrMapOvr>
+  <mc:AlternateContent xmlns:mc="http://schemas.openxmlformats.org/markup-compatibility/2006" xmlns:p14="http://schemas.microsoft.com/office/powerpoint/2010/main">
+    <mc:Choice Requires="p14">
+      <p:transition spd="med">
+        <p14:prism/>
+      </p:transition>
+    </mc:Choice>
+    <mc:Fallback xmlns="">
+      <p:transition spd="med">
+        <p:fade/>
+      </p:transition>
+    </mc:Fallback>
+  </mc:AlternateContent>
+  <p:timing>
+    <p:tnLst>
+      <p:par>
+        <p:cTn id="1" dur="indefinite" restart="never" nodeType="tmRoot"/>
+      </p:par>
+    </p:tnLst>
+  </p:timing>
+</p:sld>
+</file>
+
+<file path=ppt/slides/slide61.xml><?xml version="1.0" encoding="utf-8"?>
+<p:sld xmlns:a="http://schemas.openxmlformats.org/drawingml/2006/main" xmlns:r="http://schemas.openxmlformats.org/officeDocument/2006/relationships" xmlns:p="http://schemas.openxmlformats.org/presentationml/2006/main">
+  <p:cSld>
+    <p:spTree>
+      <p:nvGrpSpPr>
+        <p:cNvPr id="1" name=""/>
+        <p:cNvGrpSpPr/>
+        <p:nvPr/>
+      </p:nvGrpSpPr>
+      <p:grpSpPr>
+        <a:xfrm>
+          <a:off x="0" y="0"/>
+          <a:ext cx="0" cy="0"/>
+          <a:chOff x="0" y="0"/>
+          <a:chExt cx="0" cy="0"/>
+        </a:xfrm>
+      </p:grpSpPr>
+      <p:sp>
+        <p:nvSpPr>
+          <p:cNvPr id="2" name="Title 1"/>
+          <p:cNvSpPr>
+            <a:spLocks noGrp="1"/>
+          </p:cNvSpPr>
+          <p:nvPr>
+            <p:ph type="title"/>
+          </p:nvPr>
+        </p:nvSpPr>
+        <p:spPr/>
+        <p:txBody>
+          <a:bodyPr/>
+          <a:lstStyle/>
+          <a:p>
+            <a:r>
+              <a:rPr lang="en-US" dirty="0" smtClean="0"/>
+              <a:t>Machine </a:t>
+            </a:r>
+            <a:r>
+              <a:rPr lang="en-US" dirty="0" smtClean="0"/>
+              <a:t>Learning – 2 Parts	</a:t>
+            </a:r>
+            <a:endParaRPr lang="en-US" dirty="0"/>
+          </a:p>
+        </p:txBody>
+      </p:sp>
+      <p:sp>
+        <p:nvSpPr>
+          <p:cNvPr id="3" name="Content Placeholder 2"/>
+          <p:cNvSpPr>
+            <a:spLocks noGrp="1"/>
+          </p:cNvSpPr>
+          <p:nvPr>
+            <p:ph idx="1"/>
+          </p:nvPr>
+        </p:nvSpPr>
+        <p:spPr/>
+        <p:txBody>
+          <a:bodyPr/>
+          <a:lstStyle/>
+          <a:p>
+            <a:pPr marL="514350" indent="-514350">
+              <a:buFont typeface="+mj-lt"/>
+              <a:buAutoNum type="arabicPeriod"/>
+            </a:pPr>
+            <a:r>
+              <a:rPr lang="en-US" dirty="0" smtClean="0"/>
+              <a:t>Data Grouping – e.g. Amazon ‘You might like this product’</a:t>
+            </a:r>
+          </a:p>
+          <a:p>
+            <a:pPr marL="514350" indent="-514350">
+              <a:buFont typeface="+mj-lt"/>
+              <a:buAutoNum type="arabicPeriod"/>
+            </a:pPr>
+            <a:r>
+              <a:rPr lang="en-US" dirty="0" smtClean="0"/>
+              <a:t>Prediction – Log file parsing for some data pattern matching to figure out the algorithm</a:t>
+            </a:r>
+          </a:p>
+          <a:p>
+            <a:pPr marL="0" indent="0">
+              <a:buNone/>
+            </a:pPr>
+            <a:endParaRPr lang="en-US" dirty="0" smtClean="0"/>
+          </a:p>
+        </p:txBody>
+      </p:sp>
+    </p:spTree>
+    <p:extLst>
+      <p:ext uri="{BB962C8B-B14F-4D97-AF65-F5344CB8AC3E}">
+        <p14:creationId xmlns:p14="http://schemas.microsoft.com/office/powerpoint/2010/main" val="1295193001"/>
+      </p:ext>
+    </p:extLst>
+  </p:cSld>
+  <p:clrMapOvr>
+    <a:masterClrMapping/>
+  </p:clrMapOvr>
+  <mc:AlternateContent xmlns:mc="http://schemas.openxmlformats.org/markup-compatibility/2006" xmlns:p14="http://schemas.microsoft.com/office/powerpoint/2010/main">
+    <mc:Choice Requires="p14">
+      <p:transition spd="med">
+        <p14:prism/>
+      </p:transition>
+    </mc:Choice>
+    <mc:Fallback xmlns="">
+      <p:transition spd="med">
+        <p:fade/>
+      </p:transition>
+    </mc:Fallback>
+  </mc:AlternateContent>
+  <p:timing>
+    <p:tnLst>
+      <p:par>
+        <p:cTn id="1" dur="indefinite" restart="never" nodeType="tmRoot"/>
+      </p:par>
+    </p:tnLst>
+  </p:timing>
+</p:sld>
+</file>
+
+<file path=ppt/slides/slide62.xml><?xml version="1.0" encoding="utf-8"?>
+<p:sld xmlns:a="http://schemas.openxmlformats.org/drawingml/2006/main" xmlns:r="http://schemas.openxmlformats.org/officeDocument/2006/relationships" xmlns:p="http://schemas.openxmlformats.org/presentationml/2006/main">
+  <p:cSld>
+    <p:spTree>
+      <p:nvGrpSpPr>
+        <p:cNvPr id="1" name=""/>
+        <p:cNvGrpSpPr/>
+        <p:nvPr/>
+      </p:nvGrpSpPr>
+      <p:grpSpPr>
+        <a:xfrm>
+          <a:off x="0" y="0"/>
+          <a:ext cx="0" cy="0"/>
+          <a:chOff x="0" y="0"/>
+          <a:chExt cx="0" cy="0"/>
+        </a:xfrm>
+      </p:grpSpPr>
+      <p:sp>
+        <p:nvSpPr>
+          <p:cNvPr id="2" name="Title 1"/>
+          <p:cNvSpPr>
+            <a:spLocks noGrp="1"/>
+          </p:cNvSpPr>
+          <p:nvPr>
+            <p:ph type="title"/>
+          </p:nvPr>
+        </p:nvSpPr>
+        <p:spPr/>
+        <p:txBody>
+          <a:bodyPr/>
+          <a:lstStyle/>
+          <a:p>
+            <a:r>
+              <a:rPr lang="en-US" dirty="0" smtClean="0"/>
+              <a:t>Machine </a:t>
+            </a:r>
+            <a:r>
+              <a:rPr lang="en-US" dirty="0" smtClean="0"/>
+              <a:t>Learning – Typical workflow	</a:t>
+            </a:r>
+            <a:endParaRPr lang="en-US" dirty="0"/>
+          </a:p>
+        </p:txBody>
+      </p:sp>
+      <p:pic>
+        <p:nvPicPr>
+          <p:cNvPr id="4" name="Content Placeholder 3"/>
+          <p:cNvPicPr>
+            <a:picLocks noGrp="1" noChangeAspect="1"/>
+          </p:cNvPicPr>
+          <p:nvPr>
+            <p:ph idx="1"/>
+          </p:nvPr>
+        </p:nvPicPr>
+        <p:blipFill>
+          <a:blip r:embed="rId2"/>
+          <a:stretch>
+            <a:fillRect/>
+          </a:stretch>
+        </p:blipFill>
+        <p:spPr>
+          <a:xfrm>
+            <a:off x="964434" y="1690688"/>
+            <a:ext cx="8933093" cy="4351338"/>
+          </a:xfrm>
+          <a:prstGeom prst="rect">
+            <a:avLst/>
+          </a:prstGeom>
+        </p:spPr>
+      </p:pic>
+    </p:spTree>
+    <p:extLst>
+      <p:ext uri="{BB962C8B-B14F-4D97-AF65-F5344CB8AC3E}">
+        <p14:creationId xmlns:p14="http://schemas.microsoft.com/office/powerpoint/2010/main" val="2207938550"/>
       </p:ext>
     </p:extLst>
   </p:cSld>

</xml_diff>